<commit_message>
updated OH and slides
</commit_message>
<xml_diff>
--- a/slides/Trees-FenwickTrees.pptx
+++ b/slides/Trees-FenwickTrees.pptx
@@ -966,7 +966,7 @@
           <a:noFill/>
           <a:extLst>
             <a:ext uri="{909E8E84-426E-40dd-AFC4-6F175D3DCCD1}">
-              <a14:hiddenFill xmlns="" xmlns:a14="http://schemas.microsoft.com/office/drawing/2010/main">
+              <a14:hiddenFill xmlns:a14="http://schemas.microsoft.com/office/drawing/2010/main" xmlns="">
                 <a:solidFill>
                   <a:srgbClr val="FFFFFF"/>
                 </a:solidFill>
@@ -1025,7 +1025,7 @@
             </a:ln>
             <a:extLst>
               <a:ext uri="{91240B29-F687-4f45-9708-019B960494DF}">
-                <a14:hiddenLine xmlns="" xmlns:a14="http://schemas.microsoft.com/office/drawing/2010/main" w="9525">
+                <a14:hiddenLine xmlns:a14="http://schemas.microsoft.com/office/drawing/2010/main" xmlns="" w="9525">
                   <a:solidFill>
                     <a:srgbClr val="000000"/>
                   </a:solidFill>
@@ -1115,7 +1115,7 @@
             </a:ln>
             <a:extLst>
               <a:ext uri="{91240B29-F687-4f45-9708-019B960494DF}">
-                <a14:hiddenLine xmlns="" xmlns:a14="http://schemas.microsoft.com/office/drawing/2010/main" w="9525">
+                <a14:hiddenLine xmlns:a14="http://schemas.microsoft.com/office/drawing/2010/main" xmlns="" w="9525">
                   <a:solidFill>
                     <a:srgbClr val="000000"/>
                   </a:solidFill>
@@ -1205,7 +1205,7 @@
             </a:ln>
             <a:extLst>
               <a:ext uri="{91240B29-F687-4f45-9708-019B960494DF}">
-                <a14:hiddenLine xmlns="" xmlns:a14="http://schemas.microsoft.com/office/drawing/2010/main" w="9525">
+                <a14:hiddenLine xmlns:a14="http://schemas.microsoft.com/office/drawing/2010/main" xmlns="" w="9525">
                   <a:solidFill>
                     <a:srgbClr val="000000"/>
                   </a:solidFill>
@@ -1239,7 +1239,7 @@
             </a:ln>
             <a:extLst>
               <a:ext uri="{91240B29-F687-4f45-9708-019B960494DF}">
-                <a14:hiddenLine xmlns="" xmlns:a14="http://schemas.microsoft.com/office/drawing/2010/main" w="9525">
+                <a14:hiddenLine xmlns:a14="http://schemas.microsoft.com/office/drawing/2010/main" xmlns="" w="9525">
                   <a:solidFill>
                     <a:srgbClr val="000000"/>
                   </a:solidFill>
@@ -1329,7 +1329,7 @@
             </a:ln>
             <a:extLst>
               <a:ext uri="{91240B29-F687-4f45-9708-019B960494DF}">
-                <a14:hiddenLine xmlns="" xmlns:a14="http://schemas.microsoft.com/office/drawing/2010/main" w="9525">
+                <a14:hiddenLine xmlns:a14="http://schemas.microsoft.com/office/drawing/2010/main" xmlns="" w="9525">
                   <a:solidFill>
                     <a:srgbClr val="000000"/>
                   </a:solidFill>
@@ -1391,7 +1391,7 @@
             </a:ln>
             <a:extLst>
               <a:ext uri="{91240B29-F687-4f45-9708-019B960494DF}">
-                <a14:hiddenLine xmlns="" xmlns:a14="http://schemas.microsoft.com/office/drawing/2010/main" w="9525">
+                <a14:hiddenLine xmlns:a14="http://schemas.microsoft.com/office/drawing/2010/main" xmlns="" w="9525">
                   <a:solidFill>
                     <a:srgbClr val="000000"/>
                   </a:solidFill>
@@ -1453,7 +1453,7 @@
             </a:ln>
             <a:extLst>
               <a:ext uri="{91240B29-F687-4f45-9708-019B960494DF}">
-                <a14:hiddenLine xmlns="" xmlns:a14="http://schemas.microsoft.com/office/drawing/2010/main" w="9525">
+                <a14:hiddenLine xmlns:a14="http://schemas.microsoft.com/office/drawing/2010/main" xmlns="" w="9525">
                   <a:solidFill>
                     <a:srgbClr val="000000"/>
                   </a:solidFill>
@@ -1543,7 +1543,7 @@
             </a:ln>
             <a:extLst>
               <a:ext uri="{91240B29-F687-4f45-9708-019B960494DF}">
-                <a14:hiddenLine xmlns="" xmlns:a14="http://schemas.microsoft.com/office/drawing/2010/main" w="9525">
+                <a14:hiddenLine xmlns:a14="http://schemas.microsoft.com/office/drawing/2010/main" xmlns="" w="9525">
                   <a:solidFill>
                     <a:srgbClr val="000000"/>
                   </a:solidFill>
@@ -1605,7 +1605,7 @@
             </a:ln>
             <a:extLst>
               <a:ext uri="{91240B29-F687-4f45-9708-019B960494DF}">
-                <a14:hiddenLine xmlns="" xmlns:a14="http://schemas.microsoft.com/office/drawing/2010/main" w="9525">
+                <a14:hiddenLine xmlns:a14="http://schemas.microsoft.com/office/drawing/2010/main" xmlns="" w="9525">
                   <a:solidFill>
                     <a:srgbClr val="000000"/>
                   </a:solidFill>
@@ -1667,7 +1667,7 @@
             </a:ln>
             <a:extLst>
               <a:ext uri="{91240B29-F687-4f45-9708-019B960494DF}">
-                <a14:hiddenLine xmlns="" xmlns:a14="http://schemas.microsoft.com/office/drawing/2010/main" w="9525">
+                <a14:hiddenLine xmlns:a14="http://schemas.microsoft.com/office/drawing/2010/main" xmlns="" w="9525">
                   <a:solidFill>
                     <a:srgbClr val="000000"/>
                   </a:solidFill>
@@ -1757,7 +1757,7 @@
             </a:ln>
             <a:extLst>
               <a:ext uri="{91240B29-F687-4f45-9708-019B960494DF}">
-                <a14:hiddenLine xmlns="" xmlns:a14="http://schemas.microsoft.com/office/drawing/2010/main" w="9525">
+                <a14:hiddenLine xmlns:a14="http://schemas.microsoft.com/office/drawing/2010/main" xmlns="" w="9525">
                   <a:solidFill>
                     <a:srgbClr val="000000"/>
                   </a:solidFill>
@@ -1847,7 +1847,7 @@
             </a:ln>
             <a:extLst>
               <a:ext uri="{91240B29-F687-4f45-9708-019B960494DF}">
-                <a14:hiddenLine xmlns="" xmlns:a14="http://schemas.microsoft.com/office/drawing/2010/main" w="9525">
+                <a14:hiddenLine xmlns:a14="http://schemas.microsoft.com/office/drawing/2010/main" xmlns="" w="9525">
                   <a:solidFill>
                     <a:srgbClr val="000000"/>
                   </a:solidFill>
@@ -1909,7 +1909,7 @@
             </a:ln>
             <a:extLst>
               <a:ext uri="{91240B29-F687-4f45-9708-019B960494DF}">
-                <a14:hiddenLine xmlns="" xmlns:a14="http://schemas.microsoft.com/office/drawing/2010/main" w="9525">
+                <a14:hiddenLine xmlns:a14="http://schemas.microsoft.com/office/drawing/2010/main" xmlns="" w="9525">
                   <a:solidFill>
                     <a:srgbClr val="000000"/>
                   </a:solidFill>
@@ -2019,7 +2019,7 @@
             </a:ln>
             <a:extLst>
               <a:ext uri="{91240B29-F687-4f45-9708-019B960494DF}">
-                <a14:hiddenLine xmlns="" xmlns:a14="http://schemas.microsoft.com/office/drawing/2010/main" w="9525">
+                <a14:hiddenLine xmlns:a14="http://schemas.microsoft.com/office/drawing/2010/main" xmlns="" w="9525">
                   <a:solidFill>
                     <a:srgbClr val="000000"/>
                   </a:solidFill>
@@ -2081,7 +2081,7 @@
             </a:ln>
             <a:extLst>
               <a:ext uri="{91240B29-F687-4f45-9708-019B960494DF}">
-                <a14:hiddenLine xmlns="" xmlns:a14="http://schemas.microsoft.com/office/drawing/2010/main" w="9525">
+                <a14:hiddenLine xmlns:a14="http://schemas.microsoft.com/office/drawing/2010/main" xmlns="" w="9525">
                   <a:solidFill>
                     <a:srgbClr val="000000"/>
                   </a:solidFill>
@@ -2171,7 +2171,7 @@
             </a:ln>
             <a:extLst>
               <a:ext uri="{91240B29-F687-4f45-9708-019B960494DF}">
-                <a14:hiddenLine xmlns="" xmlns:a14="http://schemas.microsoft.com/office/drawing/2010/main" w="9525">
+                <a14:hiddenLine xmlns:a14="http://schemas.microsoft.com/office/drawing/2010/main" xmlns="" w="9525">
                   <a:solidFill>
                     <a:srgbClr val="000000"/>
                   </a:solidFill>
@@ -2261,7 +2261,7 @@
             </a:ln>
             <a:extLst>
               <a:ext uri="{91240B29-F687-4f45-9708-019B960494DF}">
-                <a14:hiddenLine xmlns="" xmlns:a14="http://schemas.microsoft.com/office/drawing/2010/main" w="9525">
+                <a14:hiddenLine xmlns:a14="http://schemas.microsoft.com/office/drawing/2010/main" xmlns="" w="9525">
                   <a:solidFill>
                     <a:srgbClr val="000000"/>
                   </a:solidFill>
@@ -2323,7 +2323,7 @@
             </a:ln>
             <a:extLst>
               <a:ext uri="{91240B29-F687-4f45-9708-019B960494DF}">
-                <a14:hiddenLine xmlns="" xmlns:a14="http://schemas.microsoft.com/office/drawing/2010/main" w="9525">
+                <a14:hiddenLine xmlns:a14="http://schemas.microsoft.com/office/drawing/2010/main" xmlns="" w="9525">
                   <a:solidFill>
                     <a:srgbClr val="000000"/>
                   </a:solidFill>
@@ -2413,7 +2413,7 @@
             </a:ln>
             <a:extLst>
               <a:ext uri="{91240B29-F687-4f45-9708-019B960494DF}">
-                <a14:hiddenLine xmlns="" xmlns:a14="http://schemas.microsoft.com/office/drawing/2010/main" w="9525">
+                <a14:hiddenLine xmlns:a14="http://schemas.microsoft.com/office/drawing/2010/main" xmlns="" w="9525">
                   <a:solidFill>
                     <a:srgbClr val="000000"/>
                   </a:solidFill>
@@ -2503,7 +2503,7 @@
             </a:ln>
             <a:extLst>
               <a:ext uri="{91240B29-F687-4f45-9708-019B960494DF}">
-                <a14:hiddenLine xmlns="" xmlns:a14="http://schemas.microsoft.com/office/drawing/2010/main" w="9525">
+                <a14:hiddenLine xmlns:a14="http://schemas.microsoft.com/office/drawing/2010/main" xmlns="" w="9525">
                   <a:solidFill>
                     <a:srgbClr val="000000"/>
                   </a:solidFill>
@@ -2559,7 +2559,7 @@
             </a:ln>
             <a:extLst>
               <a:ext uri="{91240B29-F687-4f45-9708-019B960494DF}">
-                <a14:hiddenLine xmlns="" xmlns:a14="http://schemas.microsoft.com/office/drawing/2010/main" w="9525">
+                <a14:hiddenLine xmlns:a14="http://schemas.microsoft.com/office/drawing/2010/main" xmlns="" w="9525">
                   <a:solidFill>
                     <a:srgbClr val="000000"/>
                   </a:solidFill>
@@ -2649,7 +2649,7 @@
             </a:ln>
             <a:extLst>
               <a:ext uri="{91240B29-F687-4f45-9708-019B960494DF}">
-                <a14:hiddenLine xmlns="" xmlns:a14="http://schemas.microsoft.com/office/drawing/2010/main" w="9525">
+                <a14:hiddenLine xmlns:a14="http://schemas.microsoft.com/office/drawing/2010/main" xmlns="" w="9525">
                   <a:solidFill>
                     <a:srgbClr val="000000"/>
                   </a:solidFill>
@@ -2705,7 +2705,7 @@
             </a:ln>
             <a:extLst>
               <a:ext uri="{91240B29-F687-4f45-9708-019B960494DF}">
-                <a14:hiddenLine xmlns="" xmlns:a14="http://schemas.microsoft.com/office/drawing/2010/main" w="9525">
+                <a14:hiddenLine xmlns:a14="http://schemas.microsoft.com/office/drawing/2010/main" xmlns="" w="9525">
                   <a:solidFill>
                     <a:srgbClr val="000000"/>
                   </a:solidFill>
@@ -2795,7 +2795,7 @@
             </a:ln>
             <a:extLst>
               <a:ext uri="{91240B29-F687-4f45-9708-019B960494DF}">
-                <a14:hiddenLine xmlns="" xmlns:a14="http://schemas.microsoft.com/office/drawing/2010/main" w="9525">
+                <a14:hiddenLine xmlns:a14="http://schemas.microsoft.com/office/drawing/2010/main" xmlns="" w="9525">
                   <a:solidFill>
                     <a:srgbClr val="000000"/>
                   </a:solidFill>
@@ -2863,7 +2863,7 @@
             </a:ln>
             <a:extLst>
               <a:ext uri="{91240B29-F687-4f45-9708-019B960494DF}">
-                <a14:hiddenLine xmlns="" xmlns:a14="http://schemas.microsoft.com/office/drawing/2010/main" w="9525">
+                <a14:hiddenLine xmlns:a14="http://schemas.microsoft.com/office/drawing/2010/main" xmlns="" w="9525">
                   <a:solidFill>
                     <a:srgbClr val="000000"/>
                   </a:solidFill>
@@ -2953,7 +2953,7 @@
             </a:ln>
             <a:extLst>
               <a:ext uri="{91240B29-F687-4f45-9708-019B960494DF}">
-                <a14:hiddenLine xmlns="" xmlns:a14="http://schemas.microsoft.com/office/drawing/2010/main" w="9525">
+                <a14:hiddenLine xmlns:a14="http://schemas.microsoft.com/office/drawing/2010/main" xmlns="" w="9525">
                   <a:solidFill>
                     <a:srgbClr val="000000"/>
                   </a:solidFill>
@@ -3021,7 +3021,7 @@
             </a:ln>
             <a:extLst>
               <a:ext uri="{91240B29-F687-4f45-9708-019B960494DF}">
-                <a14:hiddenLine xmlns="" xmlns:a14="http://schemas.microsoft.com/office/drawing/2010/main" w="9525">
+                <a14:hiddenLine xmlns:a14="http://schemas.microsoft.com/office/drawing/2010/main" xmlns="" w="9525">
                   <a:solidFill>
                     <a:srgbClr val="000000"/>
                   </a:solidFill>
@@ -3111,7 +3111,7 @@
             </a:ln>
             <a:extLst>
               <a:ext uri="{91240B29-F687-4f45-9708-019B960494DF}">
-                <a14:hiddenLine xmlns="" xmlns:a14="http://schemas.microsoft.com/office/drawing/2010/main" w="9525">
+                <a14:hiddenLine xmlns:a14="http://schemas.microsoft.com/office/drawing/2010/main" xmlns="" w="9525">
                   <a:solidFill>
                     <a:srgbClr val="000000"/>
                   </a:solidFill>
@@ -3145,7 +3145,7 @@
             </a:ln>
             <a:extLst>
               <a:ext uri="{91240B29-F687-4f45-9708-019B960494DF}">
-                <a14:hiddenLine xmlns="" xmlns:a14="http://schemas.microsoft.com/office/drawing/2010/main" w="9525">
+                <a14:hiddenLine xmlns:a14="http://schemas.microsoft.com/office/drawing/2010/main" xmlns="" w="9525">
                   <a:solidFill>
                     <a:srgbClr val="000000"/>
                   </a:solidFill>
@@ -3235,7 +3235,7 @@
             </a:ln>
             <a:extLst>
               <a:ext uri="{91240B29-F687-4f45-9708-019B960494DF}">
-                <a14:hiddenLine xmlns="" xmlns:a14="http://schemas.microsoft.com/office/drawing/2010/main" w="9525">
+                <a14:hiddenLine xmlns:a14="http://schemas.microsoft.com/office/drawing/2010/main" xmlns="" w="9525">
                   <a:solidFill>
                     <a:srgbClr val="000000"/>
                   </a:solidFill>
@@ -3297,7 +3297,7 @@
             </a:ln>
             <a:extLst>
               <a:ext uri="{91240B29-F687-4f45-9708-019B960494DF}">
-                <a14:hiddenLine xmlns="" xmlns:a14="http://schemas.microsoft.com/office/drawing/2010/main" w="9525">
+                <a14:hiddenLine xmlns:a14="http://schemas.microsoft.com/office/drawing/2010/main" xmlns="" w="9525">
                   <a:solidFill>
                     <a:srgbClr val="000000"/>
                   </a:solidFill>
@@ -3359,7 +3359,7 @@
             </a:ln>
             <a:extLst>
               <a:ext uri="{91240B29-F687-4f45-9708-019B960494DF}">
-                <a14:hiddenLine xmlns="" xmlns:a14="http://schemas.microsoft.com/office/drawing/2010/main" w="9525">
+                <a14:hiddenLine xmlns:a14="http://schemas.microsoft.com/office/drawing/2010/main" xmlns="" w="9525">
                   <a:solidFill>
                     <a:srgbClr val="000000"/>
                   </a:solidFill>
@@ -3449,7 +3449,7 @@
             </a:ln>
             <a:extLst>
               <a:ext uri="{91240B29-F687-4f45-9708-019B960494DF}">
-                <a14:hiddenLine xmlns="" xmlns:a14="http://schemas.microsoft.com/office/drawing/2010/main" w="9525">
+                <a14:hiddenLine xmlns:a14="http://schemas.microsoft.com/office/drawing/2010/main" xmlns="" w="9525">
                   <a:solidFill>
                     <a:srgbClr val="000000"/>
                   </a:solidFill>
@@ -3517,7 +3517,7 @@
             </a:ln>
             <a:extLst>
               <a:ext uri="{91240B29-F687-4f45-9708-019B960494DF}">
-                <a14:hiddenLine xmlns="" xmlns:a14="http://schemas.microsoft.com/office/drawing/2010/main" w="9525">
+                <a14:hiddenLine xmlns:a14="http://schemas.microsoft.com/office/drawing/2010/main" xmlns="" w="9525">
                   <a:solidFill>
                     <a:srgbClr val="000000"/>
                   </a:solidFill>
@@ -3579,7 +3579,7 @@
             </a:ln>
             <a:extLst>
               <a:ext uri="{91240B29-F687-4f45-9708-019B960494DF}">
-                <a14:hiddenLine xmlns="" xmlns:a14="http://schemas.microsoft.com/office/drawing/2010/main" w="9525">
+                <a14:hiddenLine xmlns:a14="http://schemas.microsoft.com/office/drawing/2010/main" xmlns="" w="9525">
                   <a:solidFill>
                     <a:srgbClr val="000000"/>
                   </a:solidFill>
@@ -3669,7 +3669,7 @@
             </a:ln>
             <a:extLst>
               <a:ext uri="{91240B29-F687-4f45-9708-019B960494DF}">
-                <a14:hiddenLine xmlns="" xmlns:a14="http://schemas.microsoft.com/office/drawing/2010/main" w="9525">
+                <a14:hiddenLine xmlns:a14="http://schemas.microsoft.com/office/drawing/2010/main" xmlns="" w="9525">
                   <a:solidFill>
                     <a:srgbClr val="000000"/>
                   </a:solidFill>
@@ -3731,7 +3731,7 @@
             </a:ln>
             <a:extLst>
               <a:ext uri="{91240B29-F687-4f45-9708-019B960494DF}">
-                <a14:hiddenLine xmlns="" xmlns:a14="http://schemas.microsoft.com/office/drawing/2010/main" w="9525">
+                <a14:hiddenLine xmlns:a14="http://schemas.microsoft.com/office/drawing/2010/main" xmlns="" w="9525">
                   <a:solidFill>
                     <a:srgbClr val="000000"/>
                   </a:solidFill>
@@ -3821,7 +3821,7 @@
             </a:ln>
             <a:extLst>
               <a:ext uri="{91240B29-F687-4f45-9708-019B960494DF}">
-                <a14:hiddenLine xmlns="" xmlns:a14="http://schemas.microsoft.com/office/drawing/2010/main" w="9525">
+                <a14:hiddenLine xmlns:a14="http://schemas.microsoft.com/office/drawing/2010/main" xmlns="" w="9525">
                   <a:solidFill>
                     <a:srgbClr val="000000"/>
                   </a:solidFill>
@@ -3883,7 +3883,7 @@
             </a:ln>
             <a:extLst>
               <a:ext uri="{91240B29-F687-4f45-9708-019B960494DF}">
-                <a14:hiddenLine xmlns="" xmlns:a14="http://schemas.microsoft.com/office/drawing/2010/main" w="9525">
+                <a14:hiddenLine xmlns:a14="http://schemas.microsoft.com/office/drawing/2010/main" xmlns="" w="9525">
                   <a:solidFill>
                     <a:srgbClr val="000000"/>
                   </a:solidFill>
@@ -3973,7 +3973,7 @@
             </a:ln>
             <a:extLst>
               <a:ext uri="{91240B29-F687-4f45-9708-019B960494DF}">
-                <a14:hiddenLine xmlns="" xmlns:a14="http://schemas.microsoft.com/office/drawing/2010/main" w="9525">
+                <a14:hiddenLine xmlns:a14="http://schemas.microsoft.com/office/drawing/2010/main" xmlns="" w="9525">
                   <a:solidFill>
                     <a:srgbClr val="000000"/>
                   </a:solidFill>
@@ -4007,7 +4007,7 @@
             </a:ln>
             <a:extLst>
               <a:ext uri="{91240B29-F687-4f45-9708-019B960494DF}">
-                <a14:hiddenLine xmlns="" xmlns:a14="http://schemas.microsoft.com/office/drawing/2010/main" w="9525">
+                <a14:hiddenLine xmlns:a14="http://schemas.microsoft.com/office/drawing/2010/main" xmlns="" w="9525">
                   <a:solidFill>
                     <a:srgbClr val="000000"/>
                   </a:solidFill>
@@ -4072,7 +4072,7 @@
             </a:ln>
             <a:extLst>
               <a:ext uri="{91240B29-F687-4f45-9708-019B960494DF}">
-                <a14:hiddenLine xmlns="" xmlns:a14="http://schemas.microsoft.com/office/drawing/2010/main" w="9525">
+                <a14:hiddenLine xmlns:a14="http://schemas.microsoft.com/office/drawing/2010/main" xmlns="" w="9525">
                   <a:solidFill>
                     <a:srgbClr val="000000"/>
                   </a:solidFill>
@@ -4162,7 +4162,7 @@
             </a:ln>
             <a:extLst>
               <a:ext uri="{91240B29-F687-4f45-9708-019B960494DF}">
-                <a14:hiddenLine xmlns="" xmlns:a14="http://schemas.microsoft.com/office/drawing/2010/main" w="9525">
+                <a14:hiddenLine xmlns:a14="http://schemas.microsoft.com/office/drawing/2010/main" xmlns="" w="9525">
                   <a:solidFill>
                     <a:srgbClr val="000000"/>
                   </a:solidFill>
@@ -4224,7 +4224,7 @@
             </a:ln>
             <a:extLst>
               <a:ext uri="{91240B29-F687-4f45-9708-019B960494DF}">
-                <a14:hiddenLine xmlns="" xmlns:a14="http://schemas.microsoft.com/office/drawing/2010/main" w="9525">
+                <a14:hiddenLine xmlns:a14="http://schemas.microsoft.com/office/drawing/2010/main" xmlns="" w="9525">
                   <a:solidFill>
                     <a:srgbClr val="000000"/>
                   </a:solidFill>
@@ -4314,7 +4314,7 @@
             </a:ln>
             <a:extLst>
               <a:ext uri="{91240B29-F687-4f45-9708-019B960494DF}">
-                <a14:hiddenLine xmlns="" xmlns:a14="http://schemas.microsoft.com/office/drawing/2010/main" w="9525">
+                <a14:hiddenLine xmlns:a14="http://schemas.microsoft.com/office/drawing/2010/main" xmlns="" w="9525">
                   <a:solidFill>
                     <a:srgbClr val="000000"/>
                   </a:solidFill>
@@ -4404,7 +4404,7 @@
             </a:ln>
             <a:extLst>
               <a:ext uri="{91240B29-F687-4f45-9708-019B960494DF}">
-                <a14:hiddenLine xmlns="" xmlns:a14="http://schemas.microsoft.com/office/drawing/2010/main" w="9525">
+                <a14:hiddenLine xmlns:a14="http://schemas.microsoft.com/office/drawing/2010/main" xmlns="" w="9525">
                   <a:solidFill>
                     <a:srgbClr val="000000"/>
                   </a:solidFill>
@@ -4469,7 +4469,7 @@
             </a:ln>
             <a:extLst>
               <a:ext uri="{91240B29-F687-4f45-9708-019B960494DF}">
-                <a14:hiddenLine xmlns="" xmlns:a14="http://schemas.microsoft.com/office/drawing/2010/main" w="9525">
+                <a14:hiddenLine xmlns:a14="http://schemas.microsoft.com/office/drawing/2010/main" xmlns="" w="9525">
                   <a:solidFill>
                     <a:srgbClr val="000000"/>
                   </a:solidFill>
@@ -4531,7 +4531,7 @@
             </a:ln>
             <a:extLst>
               <a:ext uri="{91240B29-F687-4f45-9708-019B960494DF}">
-                <a14:hiddenLine xmlns="" xmlns:a14="http://schemas.microsoft.com/office/drawing/2010/main" w="9525">
+                <a14:hiddenLine xmlns:a14="http://schemas.microsoft.com/office/drawing/2010/main" xmlns="" w="9525">
                   <a:solidFill>
                     <a:srgbClr val="000000"/>
                   </a:solidFill>
@@ -4621,7 +4621,7 @@
             </a:ln>
             <a:extLst>
               <a:ext uri="{91240B29-F687-4f45-9708-019B960494DF}">
-                <a14:hiddenLine xmlns="" xmlns:a14="http://schemas.microsoft.com/office/drawing/2010/main" w="9525">
+                <a14:hiddenLine xmlns:a14="http://schemas.microsoft.com/office/drawing/2010/main" xmlns="" w="9525">
                   <a:solidFill>
                     <a:srgbClr val="000000"/>
                   </a:solidFill>
@@ -4711,7 +4711,7 @@
             </a:ln>
             <a:extLst>
               <a:ext uri="{91240B29-F687-4f45-9708-019B960494DF}">
-                <a14:hiddenLine xmlns="" xmlns:a14="http://schemas.microsoft.com/office/drawing/2010/main" w="9525">
+                <a14:hiddenLine xmlns:a14="http://schemas.microsoft.com/office/drawing/2010/main" xmlns="" w="9525">
                   <a:solidFill>
                     <a:srgbClr val="000000"/>
                   </a:solidFill>
@@ -4773,7 +4773,7 @@
             </a:ln>
             <a:extLst>
               <a:ext uri="{91240B29-F687-4f45-9708-019B960494DF}">
-                <a14:hiddenLine xmlns="" xmlns:a14="http://schemas.microsoft.com/office/drawing/2010/main" w="9525">
+                <a14:hiddenLine xmlns:a14="http://schemas.microsoft.com/office/drawing/2010/main" xmlns="" w="9525">
                   <a:solidFill>
                     <a:srgbClr val="000000"/>
                   </a:solidFill>
@@ -4893,7 +4893,7 @@
             </a:ln>
             <a:extLst>
               <a:ext uri="{91240B29-F687-4f45-9708-019B960494DF}">
-                <a14:hiddenLine xmlns="" xmlns:a14="http://schemas.microsoft.com/office/drawing/2010/main" w="9525">
+                <a14:hiddenLine xmlns:a14="http://schemas.microsoft.com/office/drawing/2010/main" xmlns="" w="9525">
                   <a:solidFill>
                     <a:srgbClr val="000000"/>
                   </a:solidFill>
@@ -4961,7 +4961,7 @@
             </a:ln>
             <a:extLst>
               <a:ext uri="{91240B29-F687-4f45-9708-019B960494DF}">
-                <a14:hiddenLine xmlns="" xmlns:a14="http://schemas.microsoft.com/office/drawing/2010/main" w="9525">
+                <a14:hiddenLine xmlns:a14="http://schemas.microsoft.com/office/drawing/2010/main" xmlns="" w="9525">
                   <a:solidFill>
                     <a:srgbClr val="000000"/>
                   </a:solidFill>
@@ -5051,7 +5051,7 @@
             </a:ln>
             <a:extLst>
               <a:ext uri="{91240B29-F687-4f45-9708-019B960494DF}">
-                <a14:hiddenLine xmlns="" xmlns:a14="http://schemas.microsoft.com/office/drawing/2010/main" w="9525">
+                <a14:hiddenLine xmlns:a14="http://schemas.microsoft.com/office/drawing/2010/main" xmlns="" w="9525">
                   <a:solidFill>
                     <a:srgbClr val="000000"/>
                   </a:solidFill>
@@ -9880,7 +9880,7 @@
           <a:noFill/>
           <a:extLst>
             <a:ext uri="{909E8E84-426E-40dd-AFC4-6F175D3DCCD1}">
-              <a14:hiddenFill xmlns="" xmlns:a14="http://schemas.microsoft.com/office/drawing/2010/main">
+              <a14:hiddenFill xmlns:a14="http://schemas.microsoft.com/office/drawing/2010/main" xmlns="">
                 <a:solidFill>
                   <a:srgbClr val="FFFFFF"/>
                 </a:solidFill>
@@ -9954,7 +9954,7 @@
               </a:ln>
               <a:extLst>
                 <a:ext uri="{91240B29-F687-4f45-9708-019B960494DF}">
-                  <a14:hiddenLine xmlns="" xmlns:a14="http://schemas.microsoft.com/office/drawing/2010/main" w="9525">
+                  <a14:hiddenLine xmlns:a14="http://schemas.microsoft.com/office/drawing/2010/main" xmlns="" w="9525">
                     <a:solidFill>
                       <a:srgbClr val="000000"/>
                     </a:solidFill>
@@ -10044,7 +10044,7 @@
               </a:ln>
               <a:extLst>
                 <a:ext uri="{91240B29-F687-4f45-9708-019B960494DF}">
-                  <a14:hiddenLine xmlns="" xmlns:a14="http://schemas.microsoft.com/office/drawing/2010/main" w="9525">
+                  <a14:hiddenLine xmlns:a14="http://schemas.microsoft.com/office/drawing/2010/main" xmlns="" w="9525">
                     <a:solidFill>
                       <a:srgbClr val="000000"/>
                     </a:solidFill>
@@ -10134,7 +10134,7 @@
               </a:ln>
               <a:extLst>
                 <a:ext uri="{91240B29-F687-4f45-9708-019B960494DF}">
-                  <a14:hiddenLine xmlns="" xmlns:a14="http://schemas.microsoft.com/office/drawing/2010/main" w="9525">
+                  <a14:hiddenLine xmlns:a14="http://schemas.microsoft.com/office/drawing/2010/main" xmlns="" w="9525">
                     <a:solidFill>
                       <a:srgbClr val="000000"/>
                     </a:solidFill>
@@ -10196,7 +10196,7 @@
               </a:ln>
               <a:extLst>
                 <a:ext uri="{91240B29-F687-4f45-9708-019B960494DF}">
-                  <a14:hiddenLine xmlns="" xmlns:a14="http://schemas.microsoft.com/office/drawing/2010/main" w="9525">
+                  <a14:hiddenLine xmlns:a14="http://schemas.microsoft.com/office/drawing/2010/main" xmlns="" w="9525">
                     <a:solidFill>
                       <a:srgbClr val="000000"/>
                     </a:solidFill>
@@ -10286,7 +10286,7 @@
               </a:ln>
               <a:extLst>
                 <a:ext uri="{91240B29-F687-4f45-9708-019B960494DF}">
-                  <a14:hiddenLine xmlns="" xmlns:a14="http://schemas.microsoft.com/office/drawing/2010/main" w="9525">
+                  <a14:hiddenLine xmlns:a14="http://schemas.microsoft.com/office/drawing/2010/main" xmlns="" w="9525">
                     <a:solidFill>
                       <a:srgbClr val="000000"/>
                     </a:solidFill>
@@ -10348,7 +10348,7 @@
               </a:ln>
               <a:extLst>
                 <a:ext uri="{91240B29-F687-4f45-9708-019B960494DF}">
-                  <a14:hiddenLine xmlns="" xmlns:a14="http://schemas.microsoft.com/office/drawing/2010/main" w="9525">
+                  <a14:hiddenLine xmlns:a14="http://schemas.microsoft.com/office/drawing/2010/main" xmlns="" w="9525">
                     <a:solidFill>
                       <a:srgbClr val="000000"/>
                     </a:solidFill>
@@ -10410,7 +10410,7 @@
               </a:ln>
               <a:extLst>
                 <a:ext uri="{91240B29-F687-4f45-9708-019B960494DF}">
-                  <a14:hiddenLine xmlns="" xmlns:a14="http://schemas.microsoft.com/office/drawing/2010/main" w="9525">
+                  <a14:hiddenLine xmlns:a14="http://schemas.microsoft.com/office/drawing/2010/main" xmlns="" w="9525">
                     <a:solidFill>
                       <a:srgbClr val="000000"/>
                     </a:solidFill>
@@ -10500,7 +10500,7 @@
               </a:ln>
               <a:extLst>
                 <a:ext uri="{91240B29-F687-4f45-9708-019B960494DF}">
-                  <a14:hiddenLine xmlns="" xmlns:a14="http://schemas.microsoft.com/office/drawing/2010/main" w="9525">
+                  <a14:hiddenLine xmlns:a14="http://schemas.microsoft.com/office/drawing/2010/main" xmlns="" w="9525">
                     <a:solidFill>
                       <a:srgbClr val="000000"/>
                     </a:solidFill>
@@ -10590,7 +10590,7 @@
               </a:ln>
               <a:extLst>
                 <a:ext uri="{91240B29-F687-4f45-9708-019B960494DF}">
-                  <a14:hiddenLine xmlns="" xmlns:a14="http://schemas.microsoft.com/office/drawing/2010/main" w="9525">
+                  <a14:hiddenLine xmlns:a14="http://schemas.microsoft.com/office/drawing/2010/main" xmlns="" w="9525">
                     <a:solidFill>
                       <a:srgbClr val="000000"/>
                     </a:solidFill>
@@ -10652,7 +10652,7 @@
               </a:ln>
               <a:extLst>
                 <a:ext uri="{91240B29-F687-4f45-9708-019B960494DF}">
-                  <a14:hiddenLine xmlns="" xmlns:a14="http://schemas.microsoft.com/office/drawing/2010/main" w="9525">
+                  <a14:hiddenLine xmlns:a14="http://schemas.microsoft.com/office/drawing/2010/main" xmlns="" w="9525">
                     <a:solidFill>
                       <a:srgbClr val="000000"/>
                     </a:solidFill>
@@ -10762,7 +10762,7 @@
               </a:ln>
               <a:extLst>
                 <a:ext uri="{91240B29-F687-4f45-9708-019B960494DF}">
-                  <a14:hiddenLine xmlns="" xmlns:a14="http://schemas.microsoft.com/office/drawing/2010/main" w="9525">
+                  <a14:hiddenLine xmlns:a14="http://schemas.microsoft.com/office/drawing/2010/main" xmlns="" w="9525">
                     <a:solidFill>
                       <a:srgbClr val="000000"/>
                     </a:solidFill>
@@ -10846,7 +10846,7 @@
               </a:ln>
               <a:extLst>
                 <a:ext uri="{91240B29-F687-4f45-9708-019B960494DF}">
-                  <a14:hiddenLine xmlns="" xmlns:a14="http://schemas.microsoft.com/office/drawing/2010/main" w="9525">
+                  <a14:hiddenLine xmlns:a14="http://schemas.microsoft.com/office/drawing/2010/main" xmlns="" w="9525">
                     <a:solidFill>
                       <a:srgbClr val="000000"/>
                     </a:solidFill>
@@ -10908,7 +10908,7 @@
               </a:ln>
               <a:extLst>
                 <a:ext uri="{91240B29-F687-4f45-9708-019B960494DF}">
-                  <a14:hiddenLine xmlns="" xmlns:a14="http://schemas.microsoft.com/office/drawing/2010/main" w="9525">
+                  <a14:hiddenLine xmlns:a14="http://schemas.microsoft.com/office/drawing/2010/main" xmlns="" w="9525">
                     <a:solidFill>
                       <a:srgbClr val="000000"/>
                     </a:solidFill>
@@ -10970,7 +10970,7 @@
               </a:ln>
               <a:extLst>
                 <a:ext uri="{91240B29-F687-4f45-9708-019B960494DF}">
-                  <a14:hiddenLine xmlns="" xmlns:a14="http://schemas.microsoft.com/office/drawing/2010/main" w="9525">
+                  <a14:hiddenLine xmlns:a14="http://schemas.microsoft.com/office/drawing/2010/main" xmlns="" w="9525">
                     <a:solidFill>
                       <a:srgbClr val="000000"/>
                     </a:solidFill>
@@ -11060,7 +11060,7 @@
               </a:ln>
               <a:extLst>
                 <a:ext uri="{91240B29-F687-4f45-9708-019B960494DF}">
-                  <a14:hiddenLine xmlns="" xmlns:a14="http://schemas.microsoft.com/office/drawing/2010/main" w="9525">
+                  <a14:hiddenLine xmlns:a14="http://schemas.microsoft.com/office/drawing/2010/main" xmlns="" w="9525">
                     <a:solidFill>
                       <a:srgbClr val="000000"/>
                     </a:solidFill>
@@ -11094,7 +11094,7 @@
               </a:ln>
               <a:extLst>
                 <a:ext uri="{91240B29-F687-4f45-9708-019B960494DF}">
-                  <a14:hiddenLine xmlns="" xmlns:a14="http://schemas.microsoft.com/office/drawing/2010/main" w="9525">
+                  <a14:hiddenLine xmlns:a14="http://schemas.microsoft.com/office/drawing/2010/main" xmlns="" w="9525">
                     <a:solidFill>
                       <a:srgbClr val="000000"/>
                     </a:solidFill>
@@ -11159,7 +11159,7 @@
               </a:ln>
               <a:extLst>
                 <a:ext uri="{91240B29-F687-4f45-9708-019B960494DF}">
-                  <a14:hiddenLine xmlns="" xmlns:a14="http://schemas.microsoft.com/office/drawing/2010/main" w="9525">
+                  <a14:hiddenLine xmlns:a14="http://schemas.microsoft.com/office/drawing/2010/main" xmlns="" w="9525">
                     <a:solidFill>
                       <a:srgbClr val="000000"/>
                     </a:solidFill>
@@ -11249,7 +11249,7 @@
               </a:ln>
               <a:extLst>
                 <a:ext uri="{91240B29-F687-4f45-9708-019B960494DF}">
-                  <a14:hiddenLine xmlns="" xmlns:a14="http://schemas.microsoft.com/office/drawing/2010/main" w="9525">
+                  <a14:hiddenLine xmlns:a14="http://schemas.microsoft.com/office/drawing/2010/main" xmlns="" w="9525">
                     <a:solidFill>
                       <a:srgbClr val="000000"/>
                     </a:solidFill>
@@ -11311,7 +11311,7 @@
               </a:ln>
               <a:extLst>
                 <a:ext uri="{91240B29-F687-4f45-9708-019B960494DF}">
-                  <a14:hiddenLine xmlns="" xmlns:a14="http://schemas.microsoft.com/office/drawing/2010/main" w="9525">
+                  <a14:hiddenLine xmlns:a14="http://schemas.microsoft.com/office/drawing/2010/main" xmlns="" w="9525">
                     <a:solidFill>
                       <a:srgbClr val="000000"/>
                     </a:solidFill>
@@ -11401,7 +11401,7 @@
               </a:ln>
               <a:extLst>
                 <a:ext uri="{91240B29-F687-4f45-9708-019B960494DF}">
-                  <a14:hiddenLine xmlns="" xmlns:a14="http://schemas.microsoft.com/office/drawing/2010/main" w="9525">
+                  <a14:hiddenLine xmlns:a14="http://schemas.microsoft.com/office/drawing/2010/main" xmlns="" w="9525">
                     <a:solidFill>
                       <a:srgbClr val="000000"/>
                     </a:solidFill>
@@ -11466,7 +11466,7 @@
               </a:ln>
               <a:extLst>
                 <a:ext uri="{91240B29-F687-4f45-9708-019B960494DF}">
-                  <a14:hiddenLine xmlns="" xmlns:a14="http://schemas.microsoft.com/office/drawing/2010/main" w="9525">
+                  <a14:hiddenLine xmlns:a14="http://schemas.microsoft.com/office/drawing/2010/main" xmlns="" w="9525">
                     <a:solidFill>
                       <a:srgbClr val="000000"/>
                     </a:solidFill>
@@ -11528,7 +11528,7 @@
               </a:ln>
               <a:extLst>
                 <a:ext uri="{91240B29-F687-4f45-9708-019B960494DF}">
-                  <a14:hiddenLine xmlns="" xmlns:a14="http://schemas.microsoft.com/office/drawing/2010/main" w="9525">
+                  <a14:hiddenLine xmlns:a14="http://schemas.microsoft.com/office/drawing/2010/main" xmlns="" w="9525">
                     <a:solidFill>
                       <a:srgbClr val="000000"/>
                     </a:solidFill>
@@ -11618,7 +11618,7 @@
               </a:ln>
               <a:extLst>
                 <a:ext uri="{91240B29-F687-4f45-9708-019B960494DF}">
-                  <a14:hiddenLine xmlns="" xmlns:a14="http://schemas.microsoft.com/office/drawing/2010/main" w="9525">
+                  <a14:hiddenLine xmlns:a14="http://schemas.microsoft.com/office/drawing/2010/main" xmlns="" w="9525">
                     <a:solidFill>
                       <a:srgbClr val="000000"/>
                     </a:solidFill>
@@ -11708,7 +11708,7 @@
               </a:ln>
               <a:extLst>
                 <a:ext uri="{91240B29-F687-4f45-9708-019B960494DF}">
-                  <a14:hiddenLine xmlns="" xmlns:a14="http://schemas.microsoft.com/office/drawing/2010/main" w="9525">
+                  <a14:hiddenLine xmlns:a14="http://schemas.microsoft.com/office/drawing/2010/main" xmlns="" w="9525">
                     <a:solidFill>
                       <a:srgbClr val="000000"/>
                     </a:solidFill>
@@ -11773,7 +11773,7 @@
               </a:ln>
               <a:extLst>
                 <a:ext uri="{91240B29-F687-4f45-9708-019B960494DF}">
-                  <a14:hiddenLine xmlns="" xmlns:a14="http://schemas.microsoft.com/office/drawing/2010/main" w="9525">
+                  <a14:hiddenLine xmlns:a14="http://schemas.microsoft.com/office/drawing/2010/main" xmlns="" w="9525">
                     <a:solidFill>
                       <a:srgbClr val="000000"/>
                     </a:solidFill>
@@ -11893,7 +11893,7 @@
               </a:ln>
               <a:extLst>
                 <a:ext uri="{91240B29-F687-4f45-9708-019B960494DF}">
-                  <a14:hiddenLine xmlns="" xmlns:a14="http://schemas.microsoft.com/office/drawing/2010/main" w="9525">
+                  <a14:hiddenLine xmlns:a14="http://schemas.microsoft.com/office/drawing/2010/main" xmlns="" w="9525">
                     <a:solidFill>
                       <a:srgbClr val="000000"/>
                     </a:solidFill>
@@ -11974,7 +11974,7 @@
               </a:ln>
               <a:extLst>
                 <a:ext uri="{91240B29-F687-4f45-9708-019B960494DF}">
-                  <a14:hiddenLine xmlns="" xmlns:a14="http://schemas.microsoft.com/office/drawing/2010/main" w="9525">
+                  <a14:hiddenLine xmlns:a14="http://schemas.microsoft.com/office/drawing/2010/main" xmlns="" w="9525">
                     <a:solidFill>
                       <a:srgbClr val="000000"/>
                     </a:solidFill>
@@ -12089,7 +12089,7 @@
               </a:ln>
               <a:extLst>
                 <a:ext uri="{91240B29-F687-4f45-9708-019B960494DF}">
-                  <a14:hiddenLine xmlns="" xmlns:a14="http://schemas.microsoft.com/office/drawing/2010/main" w="9525">
+                  <a14:hiddenLine xmlns:a14="http://schemas.microsoft.com/office/drawing/2010/main" xmlns="" w="9525">
                     <a:solidFill>
                       <a:srgbClr val="000000"/>
                     </a:solidFill>
@@ -12179,7 +12179,7 @@
               </a:ln>
               <a:extLst>
                 <a:ext uri="{91240B29-F687-4f45-9708-019B960494DF}">
-                  <a14:hiddenLine xmlns="" xmlns:a14="http://schemas.microsoft.com/office/drawing/2010/main" w="9525">
+                  <a14:hiddenLine xmlns:a14="http://schemas.microsoft.com/office/drawing/2010/main" xmlns="" w="9525">
                     <a:solidFill>
                       <a:srgbClr val="000000"/>
                     </a:solidFill>
@@ -12244,7 +12244,7 @@
               </a:ln>
               <a:extLst>
                 <a:ext uri="{91240B29-F687-4f45-9708-019B960494DF}">
-                  <a14:hiddenLine xmlns="" xmlns:a14="http://schemas.microsoft.com/office/drawing/2010/main" w="9525">
+                  <a14:hiddenLine xmlns:a14="http://schemas.microsoft.com/office/drawing/2010/main" xmlns="" w="9525">
                     <a:solidFill>
                       <a:srgbClr val="000000"/>
                     </a:solidFill>
@@ -12334,7 +12334,7 @@
               </a:ln>
               <a:extLst>
                 <a:ext uri="{91240B29-F687-4f45-9708-019B960494DF}">
-                  <a14:hiddenLine xmlns="" xmlns:a14="http://schemas.microsoft.com/office/drawing/2010/main" w="9525">
+                  <a14:hiddenLine xmlns:a14="http://schemas.microsoft.com/office/drawing/2010/main" xmlns="" w="9525">
                     <a:solidFill>
                       <a:srgbClr val="000000"/>
                     </a:solidFill>
@@ -12402,7 +12402,7 @@
               </a:ln>
               <a:extLst>
                 <a:ext uri="{91240B29-F687-4f45-9708-019B960494DF}">
-                  <a14:hiddenLine xmlns="" xmlns:a14="http://schemas.microsoft.com/office/drawing/2010/main" w="9525">
+                  <a14:hiddenLine xmlns:a14="http://schemas.microsoft.com/office/drawing/2010/main" xmlns="" w="9525">
                     <a:solidFill>
                       <a:srgbClr val="000000"/>
                     </a:solidFill>
@@ -12492,7 +12492,7 @@
               </a:ln>
               <a:extLst>
                 <a:ext uri="{91240B29-F687-4f45-9708-019B960494DF}">
-                  <a14:hiddenLine xmlns="" xmlns:a14="http://schemas.microsoft.com/office/drawing/2010/main" w="9525">
+                  <a14:hiddenLine xmlns:a14="http://schemas.microsoft.com/office/drawing/2010/main" xmlns="" w="9525">
                     <a:solidFill>
                       <a:srgbClr val="000000"/>
                     </a:solidFill>
@@ -12560,7 +12560,7 @@
               </a:ln>
               <a:extLst>
                 <a:ext uri="{91240B29-F687-4f45-9708-019B960494DF}">
-                  <a14:hiddenLine xmlns="" xmlns:a14="http://schemas.microsoft.com/office/drawing/2010/main" w="9525">
+                  <a14:hiddenLine xmlns:a14="http://schemas.microsoft.com/office/drawing/2010/main" xmlns="" w="9525">
                     <a:solidFill>
                       <a:srgbClr val="000000"/>
                     </a:solidFill>
@@ -12650,7 +12650,7 @@
               </a:ln>
               <a:extLst>
                 <a:ext uri="{91240B29-F687-4f45-9708-019B960494DF}">
-                  <a14:hiddenLine xmlns="" xmlns:a14="http://schemas.microsoft.com/office/drawing/2010/main" w="9525">
+                  <a14:hiddenLine xmlns:a14="http://schemas.microsoft.com/office/drawing/2010/main" xmlns="" w="9525">
                     <a:solidFill>
                       <a:srgbClr val="000000"/>
                     </a:solidFill>
@@ -12684,7 +12684,7 @@
               </a:ln>
               <a:extLst>
                 <a:ext uri="{91240B29-F687-4f45-9708-019B960494DF}">
-                  <a14:hiddenLine xmlns="" xmlns:a14="http://schemas.microsoft.com/office/drawing/2010/main" w="9525">
+                  <a14:hiddenLine xmlns:a14="http://schemas.microsoft.com/office/drawing/2010/main" xmlns="" w="9525">
                     <a:solidFill>
                       <a:srgbClr val="000000"/>
                     </a:solidFill>

</xml_diff>